<commit_message>
pruebas con optimizador adagrad(Adaptive Gradient Descent)
</commit_message>
<xml_diff>
--- a/puntos/punto 2/punto_2.pptx
+++ b/puntos/punto 2/punto_2.pptx
@@ -6,8 +6,9 @@
   </p:sldMasterIdLst>
   <p:sldIdLst>
     <p:sldId id="256" r:id="rId2"/>
-    <p:sldId id="257" r:id="rId3"/>
+    <p:sldId id="259" r:id="rId3"/>
     <p:sldId id="258" r:id="rId4"/>
+    <p:sldId id="257" r:id="rId5"/>
   </p:sldIdLst>
   <p:sldSz cx="12192000" cy="6858000"/>
   <p:notesSz cx="6858000" cy="9144000"/>
@@ -338,7 +339,7 @@
           <a:p>
             <a:fld id="{C70CF37E-474B-499C-8226-9C64EE254432}" type="datetimeFigureOut">
               <a:rPr lang="es-CO" smtClean="0"/>
-              <a:t>28/10/2023</a:t>
+              <a:t>31/10/2023</a:t>
             </a:fld>
             <a:endParaRPr lang="es-CO"/>
           </a:p>
@@ -508,7 +509,7 @@
           <a:p>
             <a:fld id="{C70CF37E-474B-499C-8226-9C64EE254432}" type="datetimeFigureOut">
               <a:rPr lang="es-CO" smtClean="0"/>
-              <a:t>28/10/2023</a:t>
+              <a:t>31/10/2023</a:t>
             </a:fld>
             <a:endParaRPr lang="es-CO"/>
           </a:p>
@@ -688,7 +689,7 @@
           <a:p>
             <a:fld id="{C70CF37E-474B-499C-8226-9C64EE254432}" type="datetimeFigureOut">
               <a:rPr lang="es-CO" smtClean="0"/>
-              <a:t>28/10/2023</a:t>
+              <a:t>31/10/2023</a:t>
             </a:fld>
             <a:endParaRPr lang="es-CO"/>
           </a:p>
@@ -858,7 +859,7 @@
           <a:p>
             <a:fld id="{C70CF37E-474B-499C-8226-9C64EE254432}" type="datetimeFigureOut">
               <a:rPr lang="es-CO" smtClean="0"/>
-              <a:t>28/10/2023</a:t>
+              <a:t>31/10/2023</a:t>
             </a:fld>
             <a:endParaRPr lang="es-CO"/>
           </a:p>
@@ -1116,7 +1117,7 @@
           <a:p>
             <a:fld id="{C70CF37E-474B-499C-8226-9C64EE254432}" type="datetimeFigureOut">
               <a:rPr lang="es-CO" smtClean="0"/>
-              <a:t>28/10/2023</a:t>
+              <a:t>31/10/2023</a:t>
             </a:fld>
             <a:endParaRPr lang="es-CO"/>
           </a:p>
@@ -1404,7 +1405,7 @@
           <a:p>
             <a:fld id="{C70CF37E-474B-499C-8226-9C64EE254432}" type="datetimeFigureOut">
               <a:rPr lang="es-CO" smtClean="0"/>
-              <a:t>28/10/2023</a:t>
+              <a:t>31/10/2023</a:t>
             </a:fld>
             <a:endParaRPr lang="es-CO"/>
           </a:p>
@@ -1846,7 +1847,7 @@
           <a:p>
             <a:fld id="{C70CF37E-474B-499C-8226-9C64EE254432}" type="datetimeFigureOut">
               <a:rPr lang="es-CO" smtClean="0"/>
-              <a:t>28/10/2023</a:t>
+              <a:t>31/10/2023</a:t>
             </a:fld>
             <a:endParaRPr lang="es-CO"/>
           </a:p>
@@ -1964,7 +1965,7 @@
           <a:p>
             <a:fld id="{C70CF37E-474B-499C-8226-9C64EE254432}" type="datetimeFigureOut">
               <a:rPr lang="es-CO" smtClean="0"/>
-              <a:t>28/10/2023</a:t>
+              <a:t>31/10/2023</a:t>
             </a:fld>
             <a:endParaRPr lang="es-CO"/>
           </a:p>
@@ -2059,7 +2060,7 @@
           <a:p>
             <a:fld id="{C70CF37E-474B-499C-8226-9C64EE254432}" type="datetimeFigureOut">
               <a:rPr lang="es-CO" smtClean="0"/>
-              <a:t>28/10/2023</a:t>
+              <a:t>31/10/2023</a:t>
             </a:fld>
             <a:endParaRPr lang="es-CO"/>
           </a:p>
@@ -2347,7 +2348,7 @@
           <a:p>
             <a:fld id="{C70CF37E-474B-499C-8226-9C64EE254432}" type="datetimeFigureOut">
               <a:rPr lang="es-CO" smtClean="0"/>
-              <a:t>28/10/2023</a:t>
+              <a:t>31/10/2023</a:t>
             </a:fld>
             <a:endParaRPr lang="es-CO"/>
           </a:p>
@@ -2620,7 +2621,7 @@
           <a:p>
             <a:fld id="{C70CF37E-474B-499C-8226-9C64EE254432}" type="datetimeFigureOut">
               <a:rPr lang="es-CO" smtClean="0"/>
-              <a:t>28/10/2023</a:t>
+              <a:t>31/10/2023</a:t>
             </a:fld>
             <a:endParaRPr lang="es-CO"/>
           </a:p>
@@ -2917,7 +2918,7 @@
           <a:p>
             <a:fld id="{C70CF37E-474B-499C-8226-9C64EE254432}" type="datetimeFigureOut">
               <a:rPr lang="es-CO" smtClean="0"/>
-              <a:t>28/10/2023</a:t>
+              <a:t>31/10/2023</a:t>
             </a:fld>
             <a:endParaRPr lang="es-CO"/>
           </a:p>
@@ -3525,8 +3526,50 @@
                 <a:effectLst/>
                 <a:latin typeface="Roboto" panose="02000000000000000000" pitchFamily="2" charset="0"/>
               </a:rPr>
-              <a:t>¿Cual es el objetivo de categorizar los targets o labels correspondientes a cada imagen?</a:t>
-            </a:r>
+              <a:t>Comparación por optimizador :</a:t>
+            </a:r>
+            <a:br>
+              <a:rPr lang="es-ES" b="0" i="0" dirty="0">
+                <a:solidFill>
+                  <a:schemeClr val="bg1"/>
+                </a:solidFill>
+                <a:effectLst/>
+                <a:latin typeface="Roboto" panose="02000000000000000000" pitchFamily="2" charset="0"/>
+              </a:rPr>
+            </a:br>
+            <a:r>
+              <a:rPr lang="es-ES" dirty="0">
+                <a:solidFill>
+                  <a:schemeClr val="bg1"/>
+                </a:solidFill>
+                <a:latin typeface="Roboto" panose="02000000000000000000" pitchFamily="2" charset="0"/>
+              </a:rPr>
+              <a:t>nadam</a:t>
+            </a:r>
+            <a:br>
+              <a:rPr lang="es-ES" dirty="0">
+                <a:solidFill>
+                  <a:schemeClr val="bg1"/>
+                </a:solidFill>
+                <a:latin typeface="Roboto" panose="02000000000000000000" pitchFamily="2" charset="0"/>
+              </a:rPr>
+            </a:br>
+            <a:r>
+              <a:rPr lang="es-ES" dirty="0">
+                <a:solidFill>
+                  <a:schemeClr val="bg1"/>
+                </a:solidFill>
+                <a:latin typeface="Roboto" panose="02000000000000000000" pitchFamily="2" charset="0"/>
+              </a:rPr>
+              <a:t>(Nesterov-accelerated adaptative moment estimation)</a:t>
+            </a:r>
+            <a:endParaRPr lang="es-ES" b="0" i="0" dirty="0">
+              <a:solidFill>
+                <a:schemeClr val="bg1"/>
+              </a:solidFill>
+              <a:effectLst/>
+              <a:latin typeface="Roboto" panose="02000000000000000000" pitchFamily="2" charset="0"/>
+            </a:endParaRPr>
           </a:p>
         </p:txBody>
       </p:sp>
@@ -3548,29 +3591,47 @@
         </p:nvSpPr>
         <p:spPr>
           <a:xfrm>
-            <a:off x="3540668" y="864108"/>
-            <a:ext cx="7643800" cy="1611806"/>
+            <a:off x="3540668" y="4612410"/>
+            <a:ext cx="7643800" cy="1464234"/>
           </a:xfrm>
         </p:spPr>
         <p:txBody>
           <a:bodyPr>
-            <a:normAutofit/>
+            <a:normAutofit fontScale="92500" lnSpcReduction="20000"/>
           </a:bodyPr>
           <a:lstStyle/>
           <a:p>
             <a:r>
               <a:rPr lang="es-ES" dirty="0"/>
-              <a:t>El objetivo de categorizar los labels en cada imagen es el de establecer el valor equivalente a cada imagen en el dataframe:</a:t>
+              <a:t>Loss:  0.0631</a:t>
+            </a:r>
+          </a:p>
+          <a:p>
+            <a:r>
+              <a:rPr lang="es-ES" dirty="0"/>
+              <a:t>Accuracy:0.9852</a:t>
+            </a:r>
+          </a:p>
+          <a:p>
+            <a:r>
+              <a:rPr lang="es-ES" dirty="0"/>
+              <a:t>Precision: 0.9839</a:t>
+            </a:r>
+          </a:p>
+          <a:p>
+            <a:r>
+              <a:rPr lang="es-ES" dirty="0"/>
+              <a:t>TPE(Time Per Epoch): 7.sec</a:t>
             </a:r>
           </a:p>
         </p:txBody>
       </p:sp>
       <p:pic>
         <p:nvPicPr>
-          <p:cNvPr id="5" name="Imagen 4">
+          <p:cNvPr id="8" name="Imagen 7">
             <a:extLst>
               <a:ext uri="{FF2B5EF4-FFF2-40B4-BE49-F238E27FC236}">
-                <a16:creationId xmlns:a16="http://schemas.microsoft.com/office/drawing/2014/main" id="{21A8729D-49F2-429D-BB88-446F581775E5}"/>
+                <a16:creationId xmlns:a16="http://schemas.microsoft.com/office/drawing/2014/main" id="{B335D031-CE87-4049-9E91-D6710F1DD758}"/>
               </a:ext>
             </a:extLst>
           </p:cNvPr>
@@ -3581,13 +3642,13 @@
         </p:nvPicPr>
         <p:blipFill rotWithShape="1">
           <a:blip r:embed="rId2"/>
-          <a:srcRect l="10846" t="16504" r="21848" b="58158"/>
+          <a:srcRect l="7267" t="8801" r="7267" b="11374"/>
           <a:stretch/>
         </p:blipFill>
         <p:spPr>
           <a:xfrm>
-            <a:off x="3540668" y="2934700"/>
-            <a:ext cx="8205855" cy="1736829"/>
+            <a:off x="3540668" y="777840"/>
+            <a:ext cx="8177720" cy="3924884"/>
           </a:xfrm>
           <a:prstGeom prst="rect">
             <a:avLst/>
@@ -3597,7 +3658,7 @@
     </p:spTree>
     <p:extLst>
       <p:ext uri="{BB962C8B-B14F-4D97-AF65-F5344CB8AC3E}">
-        <p14:creationId xmlns:p14="http://schemas.microsoft.com/office/powerpoint/2010/main" val="2000176397"/>
+        <p14:creationId xmlns:p14="http://schemas.microsoft.com/office/powerpoint/2010/main" val="426178054"/>
       </p:ext>
     </p:extLst>
   </p:cSld>
@@ -3642,8 +3703,8 @@
         </p:nvSpPr>
         <p:spPr>
           <a:xfrm>
-            <a:off x="252918" y="1123837"/>
-            <a:ext cx="3052989" cy="4601183"/>
+            <a:off x="112241" y="1128408"/>
+            <a:ext cx="3137395" cy="4601183"/>
           </a:xfrm>
         </p:spPr>
         <p:txBody>
@@ -3662,8 +3723,50 @@
                 <a:effectLst/>
                 <a:latin typeface="Roboto" panose="02000000000000000000" pitchFamily="2" charset="0"/>
               </a:rPr>
-              <a:t>¿En que me ayuda la normalización a la hora de entrenar los datos?</a:t>
-            </a:r>
+              <a:t>Comparación por optimizador :</a:t>
+            </a:r>
+            <a:br>
+              <a:rPr lang="es-ES" b="0" i="0" dirty="0">
+                <a:solidFill>
+                  <a:schemeClr val="bg1"/>
+                </a:solidFill>
+                <a:effectLst/>
+                <a:latin typeface="Roboto" panose="02000000000000000000" pitchFamily="2" charset="0"/>
+              </a:rPr>
+            </a:br>
+            <a:r>
+              <a:rPr lang="es-ES" dirty="0">
+                <a:solidFill>
+                  <a:schemeClr val="bg1"/>
+                </a:solidFill>
+                <a:latin typeface="Roboto" panose="02000000000000000000" pitchFamily="2" charset="0"/>
+              </a:rPr>
+              <a:t>nadam</a:t>
+            </a:r>
+            <a:br>
+              <a:rPr lang="es-ES" dirty="0">
+                <a:solidFill>
+                  <a:schemeClr val="bg1"/>
+                </a:solidFill>
+                <a:latin typeface="Roboto" panose="02000000000000000000" pitchFamily="2" charset="0"/>
+              </a:rPr>
+            </a:br>
+            <a:r>
+              <a:rPr lang="es-ES" dirty="0">
+                <a:solidFill>
+                  <a:schemeClr val="bg1"/>
+                </a:solidFill>
+                <a:latin typeface="Roboto" panose="02000000000000000000" pitchFamily="2" charset="0"/>
+              </a:rPr>
+              <a:t>(Nesterov-accelerated adaptative moment estimation)</a:t>
+            </a:r>
+            <a:endParaRPr lang="es-ES" b="0" i="0" dirty="0">
+              <a:solidFill>
+                <a:schemeClr val="bg1"/>
+              </a:solidFill>
+              <a:effectLst/>
+              <a:latin typeface="Roboto" panose="02000000000000000000" pitchFamily="2" charset="0"/>
+            </a:endParaRPr>
           </a:p>
         </p:txBody>
       </p:sp>
@@ -3685,29 +3788,47 @@
         </p:nvSpPr>
         <p:spPr>
           <a:xfrm>
-            <a:off x="3540668" y="864108"/>
-            <a:ext cx="7643800" cy="1611806"/>
+            <a:off x="3540668" y="4612410"/>
+            <a:ext cx="7643800" cy="1464234"/>
           </a:xfrm>
         </p:spPr>
         <p:txBody>
           <a:bodyPr>
-            <a:normAutofit/>
+            <a:normAutofit fontScale="92500" lnSpcReduction="20000"/>
           </a:bodyPr>
           <a:lstStyle/>
           <a:p>
             <a:r>
               <a:rPr lang="es-ES" dirty="0"/>
-              <a:t>Ayuda en varios aspectos, uno de ellos es la velocidad de procesamiento por los métodos numéricos , </a:t>
+              <a:t>Loss:  0.0631</a:t>
+            </a:r>
+          </a:p>
+          <a:p>
+            <a:r>
+              <a:rPr lang="es-ES" dirty="0"/>
+              <a:t>Accuracy:0.9852</a:t>
+            </a:r>
+          </a:p>
+          <a:p>
+            <a:r>
+              <a:rPr lang="es-ES" dirty="0"/>
+              <a:t>Precision: 0.9839</a:t>
+            </a:r>
+          </a:p>
+          <a:p>
+            <a:r>
+              <a:rPr lang="es-ES" dirty="0"/>
+              <a:t>TPE(Time Per Epoch): 7.sec</a:t>
             </a:r>
           </a:p>
         </p:txBody>
       </p:sp>
       <p:pic>
         <p:nvPicPr>
-          <p:cNvPr id="5" name="Imagen 4">
+          <p:cNvPr id="8" name="Imagen 7">
             <a:extLst>
               <a:ext uri="{FF2B5EF4-FFF2-40B4-BE49-F238E27FC236}">
-                <a16:creationId xmlns:a16="http://schemas.microsoft.com/office/drawing/2014/main" id="{21A8729D-49F2-429D-BB88-446F581775E5}"/>
+                <a16:creationId xmlns:a16="http://schemas.microsoft.com/office/drawing/2014/main" id="{B335D031-CE87-4049-9E91-D6710F1DD758}"/>
               </a:ext>
             </a:extLst>
           </p:cNvPr>
@@ -3718,13 +3839,13 @@
         </p:nvPicPr>
         <p:blipFill rotWithShape="1">
           <a:blip r:embed="rId2"/>
-          <a:srcRect l="10846" t="16504" r="21848" b="58158"/>
+          <a:srcRect l="7267" t="8801" r="7267" b="11374"/>
           <a:stretch/>
         </p:blipFill>
         <p:spPr>
           <a:xfrm>
-            <a:off x="3540668" y="2934700"/>
-            <a:ext cx="8205855" cy="1736829"/>
+            <a:off x="3540668" y="777840"/>
+            <a:ext cx="8177720" cy="3924884"/>
           </a:xfrm>
           <a:prstGeom prst="rect">
             <a:avLst/>
@@ -3734,7 +3855,200 @@
     </p:spTree>
     <p:extLst>
       <p:ext uri="{BB962C8B-B14F-4D97-AF65-F5344CB8AC3E}">
-        <p14:creationId xmlns:p14="http://schemas.microsoft.com/office/powerpoint/2010/main" val="4212487264"/>
+        <p14:creationId xmlns:p14="http://schemas.microsoft.com/office/powerpoint/2010/main" val="1140286905"/>
+      </p:ext>
+    </p:extLst>
+  </p:cSld>
+  <p:clrMapOvr>
+    <a:masterClrMapping/>
+  </p:clrMapOvr>
+</p:sld>
+</file>
+
+<file path=ppt/slides/slide4.xml><?xml version="1.0" encoding="utf-8"?>
+<p:sld xmlns:a="http://schemas.openxmlformats.org/drawingml/2006/main" xmlns:r="http://schemas.openxmlformats.org/officeDocument/2006/relationships" xmlns:p="http://schemas.openxmlformats.org/presentationml/2006/main">
+  <p:cSld>
+    <p:spTree>
+      <p:nvGrpSpPr>
+        <p:cNvPr id="1" name=""/>
+        <p:cNvGrpSpPr/>
+        <p:nvPr/>
+      </p:nvGrpSpPr>
+      <p:grpSpPr>
+        <a:xfrm>
+          <a:off x="0" y="0"/>
+          <a:ext cx="0" cy="0"/>
+          <a:chOff x="0" y="0"/>
+          <a:chExt cx="0" cy="0"/>
+        </a:xfrm>
+      </p:grpSpPr>
+      <p:sp>
+        <p:nvSpPr>
+          <p:cNvPr id="2" name="Título 1">
+            <a:extLst>
+              <a:ext uri="{FF2B5EF4-FFF2-40B4-BE49-F238E27FC236}">
+                <a16:creationId xmlns:a16="http://schemas.microsoft.com/office/drawing/2014/main" id="{0CC63EF4-45CF-465B-81D9-62914FA07B99}"/>
+              </a:ext>
+            </a:extLst>
+          </p:cNvPr>
+          <p:cNvSpPr>
+            <a:spLocks noGrp="1"/>
+          </p:cNvSpPr>
+          <p:nvPr>
+            <p:ph type="title"/>
+          </p:nvPr>
+        </p:nvSpPr>
+        <p:spPr>
+          <a:xfrm>
+            <a:off x="112241" y="1128408"/>
+            <a:ext cx="3137395" cy="4601183"/>
+          </a:xfrm>
+        </p:spPr>
+        <p:txBody>
+          <a:bodyPr/>
+          <a:lstStyle/>
+          <a:p>
+            <a:pPr algn="l">
+              <a:buFont typeface="Arial" panose="020B0604020202020204" pitchFamily="34" charset="0"/>
+              <a:buChar char="•"/>
+            </a:pPr>
+            <a:r>
+              <a:rPr lang="es-ES" b="0" i="0" dirty="0">
+                <a:solidFill>
+                  <a:schemeClr val="bg1"/>
+                </a:solidFill>
+                <a:effectLst/>
+                <a:latin typeface="Roboto" panose="02000000000000000000" pitchFamily="2" charset="0"/>
+              </a:rPr>
+              <a:t>Comparación por optimizador :</a:t>
+            </a:r>
+            <a:br>
+              <a:rPr lang="es-ES" b="0" i="0" dirty="0">
+                <a:solidFill>
+                  <a:schemeClr val="bg1"/>
+                </a:solidFill>
+                <a:effectLst/>
+                <a:latin typeface="Roboto" panose="02000000000000000000" pitchFamily="2" charset="0"/>
+              </a:rPr>
+            </a:br>
+            <a:r>
+              <a:rPr lang="es-ES" b="0" i="0" dirty="0">
+                <a:solidFill>
+                  <a:schemeClr val="bg1"/>
+                </a:solidFill>
+                <a:effectLst/>
+                <a:latin typeface="Roboto" panose="02000000000000000000" pitchFamily="2" charset="0"/>
+              </a:rPr>
+              <a:t>FTRL</a:t>
+            </a:r>
+            <a:br>
+              <a:rPr lang="es-ES" b="0" i="0" dirty="0">
+                <a:solidFill>
+                  <a:schemeClr val="bg1"/>
+                </a:solidFill>
+                <a:effectLst/>
+                <a:latin typeface="Roboto" panose="02000000000000000000" pitchFamily="2" charset="0"/>
+              </a:rPr>
+            </a:br>
+            <a:r>
+              <a:rPr lang="es-ES" b="0" i="0" dirty="0">
+                <a:solidFill>
+                  <a:schemeClr val="bg1"/>
+                </a:solidFill>
+                <a:effectLst/>
+                <a:latin typeface="Roboto" panose="02000000000000000000" pitchFamily="2" charset="0"/>
+              </a:rPr>
+              <a:t>(Follow the regularized leader)</a:t>
+            </a:r>
+          </a:p>
+        </p:txBody>
+      </p:sp>
+      <p:sp>
+        <p:nvSpPr>
+          <p:cNvPr id="3" name="Marcador de contenido 2">
+            <a:extLst>
+              <a:ext uri="{FF2B5EF4-FFF2-40B4-BE49-F238E27FC236}">
+                <a16:creationId xmlns:a16="http://schemas.microsoft.com/office/drawing/2014/main" id="{976DDA77-E3DB-4F01-8CAE-B2B1A34B8B53}"/>
+              </a:ext>
+            </a:extLst>
+          </p:cNvPr>
+          <p:cNvSpPr>
+            <a:spLocks noGrp="1"/>
+          </p:cNvSpPr>
+          <p:nvPr>
+            <p:ph idx="1"/>
+          </p:nvPr>
+        </p:nvSpPr>
+        <p:spPr>
+          <a:xfrm>
+            <a:off x="3540668" y="4612410"/>
+            <a:ext cx="7643800" cy="1464234"/>
+          </a:xfrm>
+        </p:spPr>
+        <p:txBody>
+          <a:bodyPr>
+            <a:normAutofit fontScale="92500" lnSpcReduction="20000"/>
+          </a:bodyPr>
+          <a:lstStyle/>
+          <a:p>
+            <a:r>
+              <a:rPr lang="es-ES" dirty="0"/>
+              <a:t>Loss:  1.8365</a:t>
+            </a:r>
+          </a:p>
+          <a:p>
+            <a:r>
+              <a:rPr lang="es-ES" dirty="0"/>
+              <a:t>Accuracy:0.4274</a:t>
+            </a:r>
+          </a:p>
+          <a:p>
+            <a:r>
+              <a:rPr lang="es-ES" dirty="0"/>
+              <a:t>Precision: 0.9877</a:t>
+            </a:r>
+          </a:p>
+          <a:p>
+            <a:r>
+              <a:rPr lang="es-ES" dirty="0"/>
+              <a:t>TPE(Time Per Epoch): 7.sec</a:t>
+            </a:r>
+          </a:p>
+        </p:txBody>
+      </p:sp>
+      <p:pic>
+        <p:nvPicPr>
+          <p:cNvPr id="6" name="Imagen 5">
+            <a:extLst>
+              <a:ext uri="{FF2B5EF4-FFF2-40B4-BE49-F238E27FC236}">
+                <a16:creationId xmlns:a16="http://schemas.microsoft.com/office/drawing/2014/main" id="{97E1BE14-016B-478F-A812-1C436870EFC8}"/>
+              </a:ext>
+            </a:extLst>
+          </p:cNvPr>
+          <p:cNvPicPr>
+            <a:picLocks noChangeAspect="1"/>
+          </p:cNvPicPr>
+          <p:nvPr/>
+        </p:nvPicPr>
+        <p:blipFill rotWithShape="1">
+          <a:blip r:embed="rId2"/>
+          <a:srcRect l="6693" t="9211" r="6538" b="14649"/>
+          <a:stretch/>
+        </p:blipFill>
+        <p:spPr>
+          <a:xfrm>
+            <a:off x="3540668" y="781357"/>
+            <a:ext cx="7765366" cy="3831052"/>
+          </a:xfrm>
+          <a:prstGeom prst="rect">
+            <a:avLst/>
+          </a:prstGeom>
+        </p:spPr>
+      </p:pic>
+    </p:spTree>
+    <p:extLst>
+      <p:ext uri="{BB962C8B-B14F-4D97-AF65-F5344CB8AC3E}">
+        <p14:creationId xmlns:p14="http://schemas.microsoft.com/office/powerpoint/2010/main" val="2000176397"/>
       </p:ext>
     </p:extLst>
   </p:cSld>

</xml_diff>